<commit_message>
Minor update of slides for Termin_2.
</commit_message>
<xml_diff>
--- a/Termin_2/folien/UebungModellierung#2.pptx
+++ b/Termin_2/folien/UebungModellierung#2.pptx
@@ -403,7 +403,7 @@
     </p:spTree>
     <p:extLst>
       <p:ext uri="{BB962C8B-B14F-4D97-AF65-F5344CB8AC3E}">
-        <p14:creationId xmlns:p14="http://schemas.microsoft.com/office/powerpoint/2010/main" xmlns="" val="1882660213"/>
+        <p14:creationId xmlns="" xmlns:p14="http://schemas.microsoft.com/office/powerpoint/2010/main" val="1882660213"/>
       </p:ext>
     </p:extLst>
   </p:cSld>
@@ -742,7 +742,7 @@
     </p:spTree>
     <p:extLst>
       <p:ext uri="{BB962C8B-B14F-4D97-AF65-F5344CB8AC3E}">
-        <p14:creationId xmlns:p14="http://schemas.microsoft.com/office/powerpoint/2010/main" xmlns="" val="2781074432"/>
+        <p14:creationId xmlns="" xmlns:p14="http://schemas.microsoft.com/office/powerpoint/2010/main" val="2781074432"/>
       </p:ext>
     </p:extLst>
   </p:cSld>
@@ -4520,7 +4520,37 @@
                 <a:latin typeface="Calibri" pitchFamily="34" charset="0"/>
                 <a:cs typeface="+mn-cs"/>
               </a:rPr>
-              <a:t>Übung zur Einführung in die Modellierung, Wintersemester 2016/17                 #</a:t>
+              <a:t>Seminar „Einführung </a:t>
+            </a:r>
+            <a:r>
+              <a:rPr lang="de-DE" noProof="0" dirty="0" smtClean="0">
+                <a:solidFill>
+                  <a:schemeClr val="bg1"/>
+                </a:solidFill>
+                <a:latin typeface="Calibri" pitchFamily="34" charset="0"/>
+                <a:cs typeface="+mn-cs"/>
+              </a:rPr>
+              <a:t>in die </a:t>
+            </a:r>
+            <a:r>
+              <a:rPr lang="de-DE" noProof="0" dirty="0" smtClean="0">
+                <a:solidFill>
+                  <a:schemeClr val="bg1"/>
+                </a:solidFill>
+                <a:latin typeface="Calibri" pitchFamily="34" charset="0"/>
+                <a:cs typeface="+mn-cs"/>
+              </a:rPr>
+              <a:t>Modellierung“, </a:t>
+            </a:r>
+            <a:r>
+              <a:rPr lang="de-DE" noProof="0" dirty="0" smtClean="0">
+                <a:solidFill>
+                  <a:schemeClr val="bg1"/>
+                </a:solidFill>
+                <a:latin typeface="Calibri" pitchFamily="34" charset="0"/>
+                <a:cs typeface="+mn-cs"/>
+              </a:rPr>
+              <a:t>Wintersemester 2016/17                 #</a:t>
             </a:r>
             <a:fld id="{19621714-58BB-457A-826B-841F6E217726}" type="slidenum">
               <a:rPr lang="de-DE" noProof="0" smtClean="0">
@@ -5291,38 +5321,44 @@
                 <a:rPr lang="de-DE" sz="2000" dirty="0" smtClean="0">
                   <a:latin typeface="Calibri" pitchFamily="34" charset="0"/>
                 </a:rPr>
-                <a:t>Übung im </a:t>
+                <a:t>Seminar </a:t>
               </a:r>
               <a:r>
-                <a:rPr lang="de-DE" sz="2000" smtClean="0">
+                <a:rPr lang="de-DE" sz="2000" i="1" dirty="0" smtClean="0">
                   <a:latin typeface="Calibri" pitchFamily="34" charset="0"/>
                 </a:rPr>
-                <a:t>Modul </a:t>
-              </a:r>
-              <a:br>
-                <a:rPr lang="de-DE" sz="2000" smtClean="0">
-                  <a:latin typeface="Calibri" pitchFamily="34" charset="0"/>
-                </a:rPr>
-              </a:br>
-              <a:r>
-                <a:rPr lang="de-DE" sz="2000" smtClean="0">
-                  <a:latin typeface="Calibri" pitchFamily="34" charset="0"/>
-                </a:rPr>
-                <a:t>Versuchsplanung </a:t>
+                <a:t>Einführung in die Modellierung</a:t>
               </a:r>
               <a:r>
                 <a:rPr lang="de-DE" sz="2000" dirty="0" smtClean="0">
                   <a:latin typeface="Calibri" pitchFamily="34" charset="0"/>
                 </a:rPr>
-                <a:t>und </a:t>
+                <a:t/>
+              </a:r>
+              <a:br>
+                <a:rPr lang="de-DE" sz="2000" dirty="0" smtClean="0">
+                  <a:latin typeface="Calibri" pitchFamily="34" charset="0"/>
+                </a:rPr>
+              </a:br>
+              <a:r>
+                <a:rPr lang="de-DE" sz="2000" dirty="0" smtClean="0">
+                  <a:latin typeface="Calibri" pitchFamily="34" charset="0"/>
+                </a:rPr>
+                <a:t>im Modul </a:t>
               </a:r>
               <a:r>
-                <a:rPr lang="de-DE" sz="2000" smtClean="0">
+                <a:rPr lang="de-DE" sz="2000" i="1" dirty="0" smtClean="0">
                   <a:latin typeface="Calibri" pitchFamily="34" charset="0"/>
                 </a:rPr>
-                <a:t>Geoökologische Modellierung</a:t>
+                <a:t>Versuchsplanung und Geoökologische </a:t>
               </a:r>
-              <a:endParaRPr lang="de-DE" sz="2000" dirty="0" smtClean="0">
+              <a:r>
+                <a:rPr lang="de-DE" sz="2000" i="1" dirty="0" smtClean="0">
+                  <a:latin typeface="Calibri" pitchFamily="34" charset="0"/>
+                </a:rPr>
+                <a:t>Modellierung</a:t>
+              </a:r>
+              <a:endParaRPr lang="de-DE" sz="2000" i="1" dirty="0" smtClean="0">
                 <a:latin typeface="Calibri" pitchFamily="34" charset="0"/>
               </a:endParaRPr>
             </a:p>
@@ -18515,12 +18551,6 @@
               </a:rPr>
               <a:t>Das abc-Modell auf dem Prüfstand</a:t>
             </a:r>
-            <a:endParaRPr lang="de-DE" sz="2800" dirty="0" smtClean="0">
-              <a:solidFill>
-                <a:srgbClr val="2B5681"/>
-              </a:solidFill>
-              <a:latin typeface="Calibri" pitchFamily="34" charset="0"/>
-            </a:endParaRPr>
           </a:p>
         </p:txBody>
       </p:sp>
@@ -20750,6 +20780,74 @@
       </p:grpSpPr>
       <p:sp>
         <p:nvSpPr>
+          <p:cNvPr id="17" name="Abgerundetes Rechteck 16"/>
+          <p:cNvSpPr/>
+          <p:nvPr/>
+        </p:nvSpPr>
+        <p:spPr bwMode="auto">
+          <a:xfrm>
+            <a:off x="611188" y="4283368"/>
+            <a:ext cx="7273925" cy="1512000"/>
+          </a:xfrm>
+          <a:prstGeom prst="roundRect">
+            <a:avLst>
+              <a:gd name="adj" fmla="val 5866"/>
+            </a:avLst>
+          </a:prstGeom>
+          <a:solidFill>
+            <a:schemeClr val="accent6">
+              <a:lumMod val="20000"/>
+              <a:lumOff val="80000"/>
+            </a:schemeClr>
+          </a:solidFill>
+          <a:ln w="19050" cap="flat" cmpd="sng" algn="ctr">
+            <a:noFill/>
+            <a:prstDash val="solid"/>
+            <a:round/>
+            <a:headEnd type="none" w="med" len="med"/>
+            <a:tailEnd type="none" w="med" len="med"/>
+          </a:ln>
+          <a:effectLst/>
+        </p:spPr>
+        <p:txBody>
+          <a:bodyPr vert="horz" wrap="square" lIns="91440" tIns="45720" rIns="91440" bIns="45720" numCol="1" rtlCol="0" anchor="t" anchorCtr="0" compatLnSpc="1">
+            <a:prstTxWarp prst="textNoShape">
+              <a:avLst/>
+            </a:prstTxWarp>
+          </a:bodyPr>
+          <a:lstStyle/>
+          <a:p>
+            <a:pPr marL="0" marR="0" indent="0" algn="l" defTabSz="914400" rtl="0" eaLnBrk="1" fontAlgn="base" latinLnBrk="0" hangingPunct="1">
+              <a:lnSpc>
+                <a:spcPct val="100000"/>
+              </a:lnSpc>
+              <a:spcBef>
+                <a:spcPct val="0"/>
+              </a:spcBef>
+              <a:spcAft>
+                <a:spcPct val="0"/>
+              </a:spcAft>
+              <a:buClrTx/>
+              <a:buSzTx/>
+              <a:buFontTx/>
+              <a:buNone/>
+              <a:tabLst/>
+            </a:pPr>
+            <a:endParaRPr kumimoji="0" lang="de-DE" sz="1600" b="0" i="0" u="none" strike="noStrike" cap="none" normalizeH="0" baseline="0" smtClean="0">
+              <a:ln>
+                <a:noFill/>
+              </a:ln>
+              <a:solidFill>
+                <a:schemeClr val="tx1"/>
+              </a:solidFill>
+              <a:effectLst/>
+              <a:latin typeface="Arial" charset="0"/>
+            </a:endParaRPr>
+          </a:p>
+        </p:txBody>
+      </p:sp>
+      <p:sp>
+        <p:nvSpPr>
           <p:cNvPr id="13" name="Textfeld 12"/>
           <p:cNvSpPr txBox="1"/>
           <p:nvPr/>
@@ -21890,7 +21988,98 @@
                             </p:stCondLst>
                             <p:childTnLst>
                               <p:par>
-                                <p:cTn id="13" presetID="1" presetClass="entr" presetSubtype="0" fill="hold" grpId="0" nodeType="clickEffect">
+                                <p:cTn id="13" presetID="23" presetClass="entr" presetSubtype="272" fill="hold" grpId="0" nodeType="clickEffect">
+                                  <p:stCondLst>
+                                    <p:cond delay="0"/>
+                                  </p:stCondLst>
+                                  <p:childTnLst>
+                                    <p:set>
+                                      <p:cBhvr>
+                                        <p:cTn id="14" dur="1" fill="hold">
+                                          <p:stCondLst>
+                                            <p:cond delay="0"/>
+                                          </p:stCondLst>
+                                        </p:cTn>
+                                        <p:tgtEl>
+                                          <p:spTgt spid="17"/>
+                                        </p:tgtEl>
+                                        <p:attrNameLst>
+                                          <p:attrName>style.visibility</p:attrName>
+                                        </p:attrNameLst>
+                                      </p:cBhvr>
+                                      <p:to>
+                                        <p:strVal val="visible"/>
+                                      </p:to>
+                                    </p:set>
+                                    <p:anim calcmode="lin" valueType="num">
+                                      <p:cBhvr>
+                                        <p:cTn id="15" dur="500" fill="hold"/>
+                                        <p:tgtEl>
+                                          <p:spTgt spid="17"/>
+                                        </p:tgtEl>
+                                        <p:attrNameLst>
+                                          <p:attrName>ppt_w</p:attrName>
+                                        </p:attrNameLst>
+                                      </p:cBhvr>
+                                      <p:tavLst>
+                                        <p:tav tm="0">
+                                          <p:val>
+                                            <p:strVal val="2/3*#ppt_w"/>
+                                          </p:val>
+                                        </p:tav>
+                                        <p:tav tm="100000">
+                                          <p:val>
+                                            <p:strVal val="#ppt_w"/>
+                                          </p:val>
+                                        </p:tav>
+                                      </p:tavLst>
+                                    </p:anim>
+                                    <p:anim calcmode="lin" valueType="num">
+                                      <p:cBhvr>
+                                        <p:cTn id="16" dur="500" fill="hold"/>
+                                        <p:tgtEl>
+                                          <p:spTgt spid="17"/>
+                                        </p:tgtEl>
+                                        <p:attrNameLst>
+                                          <p:attrName>ppt_h</p:attrName>
+                                        </p:attrNameLst>
+                                      </p:cBhvr>
+                                      <p:tavLst>
+                                        <p:tav tm="0">
+                                          <p:val>
+                                            <p:strVal val="2/3*#ppt_h"/>
+                                          </p:val>
+                                        </p:tav>
+                                        <p:tav tm="100000">
+                                          <p:val>
+                                            <p:strVal val="#ppt_h"/>
+                                          </p:val>
+                                        </p:tav>
+                                      </p:tavLst>
+                                    </p:anim>
+                                  </p:childTnLst>
+                                </p:cTn>
+                              </p:par>
+                            </p:childTnLst>
+                          </p:cTn>
+                        </p:par>
+                      </p:childTnLst>
+                    </p:cTn>
+                  </p:par>
+                  <p:par>
+                    <p:cTn id="17" fill="hold">
+                      <p:stCondLst>
+                        <p:cond delay="indefinite"/>
+                      </p:stCondLst>
+                      <p:childTnLst>
+                        <p:par>
+                          <p:cTn id="18" fill="hold">
+                            <p:stCondLst>
+                              <p:cond delay="0"/>
+                            </p:stCondLst>
+                            <p:childTnLst>
+                              <p:par>
+                                <p:cTn id="19" presetID="1" presetClass="entr" presetSubtype="0" fill="hold" grpId="0" nodeType="clickEffect">
                                   <p:stCondLst>
                                     <p:cond delay="0"/>
                                   </p:stCondLst>
@@ -21900,7 +22089,7 @@
                                   <p:childTnLst>
                                     <p:set>
                                       <p:cBhvr>
-                                        <p:cTn id="14" dur="1" fill="hold">
+                                        <p:cTn id="20" dur="1" fill="hold">
                                           <p:stCondLst>
                                             <p:cond delay="0"/>
                                           </p:stCondLst>
@@ -21926,19 +22115,19 @@
                     </p:cTn>
                   </p:par>
                   <p:par>
-                    <p:cTn id="15" fill="hold">
+                    <p:cTn id="21" fill="hold">
                       <p:stCondLst>
                         <p:cond delay="indefinite"/>
                       </p:stCondLst>
                       <p:childTnLst>
                         <p:par>
-                          <p:cTn id="16" fill="hold">
+                          <p:cTn id="22" fill="hold">
                             <p:stCondLst>
                               <p:cond delay="0"/>
                             </p:stCondLst>
                             <p:childTnLst>
                               <p:par>
-                                <p:cTn id="17" presetID="1" presetClass="entr" presetSubtype="0" fill="hold" grpId="0" nodeType="clickEffect">
+                                <p:cTn id="23" presetID="1" presetClass="entr" presetSubtype="0" fill="hold" grpId="0" nodeType="clickEffect">
                                   <p:stCondLst>
                                     <p:cond delay="0"/>
                                   </p:stCondLst>
@@ -21948,7 +22137,7 @@
                                   <p:childTnLst>
                                     <p:set>
                                       <p:cBhvr>
-                                        <p:cTn id="18" dur="1" fill="hold">
+                                        <p:cTn id="24" dur="1" fill="hold">
                                           <p:stCondLst>
                                             <p:cond delay="0"/>
                                           </p:stCondLst>
@@ -21974,19 +22163,19 @@
                     </p:cTn>
                   </p:par>
                   <p:par>
-                    <p:cTn id="19" fill="hold">
+                    <p:cTn id="25" fill="hold">
                       <p:stCondLst>
                         <p:cond delay="indefinite"/>
                       </p:stCondLst>
                       <p:childTnLst>
                         <p:par>
-                          <p:cTn id="20" fill="hold">
+                          <p:cTn id="26" fill="hold">
                             <p:stCondLst>
                               <p:cond delay="0"/>
                             </p:stCondLst>
                             <p:childTnLst>
                               <p:par>
-                                <p:cTn id="21" presetID="1" presetClass="entr" presetSubtype="0" fill="hold" grpId="0" nodeType="clickEffect">
+                                <p:cTn id="27" presetID="1" presetClass="entr" presetSubtype="0" fill="hold" grpId="0" nodeType="clickEffect">
                                   <p:stCondLst>
                                     <p:cond delay="0"/>
                                   </p:stCondLst>
@@ -21996,7 +22185,7 @@
                                   <p:childTnLst>
                                     <p:set>
                                       <p:cBhvr>
-                                        <p:cTn id="22" dur="1" fill="hold">
+                                        <p:cTn id="28" dur="1" fill="hold">
                                           <p:stCondLst>
                                             <p:cond delay="0"/>
                                           </p:stCondLst>
@@ -22043,6 +22232,7 @@
       </p:par>
     </p:tnLst>
     <p:bldLst>
+      <p:bldP spid="17" grpId="0" animBg="1"/>
       <p:bldP spid="11" grpId="0"/>
       <p:bldP spid="12" grpId="0"/>
       <p:bldP spid="14" grpId="0"/>

</xml_diff>

<commit_message>
Updated slides for Termin_2 and Termin_3.
</commit_message>
<xml_diff>
--- a/Termin_2/folien/UebungModellierung#2.pptx
+++ b/Termin_2/folien/UebungModellierung#2.pptx
@@ -403,7 +403,7 @@
     </p:spTree>
     <p:extLst>
       <p:ext uri="{BB962C8B-B14F-4D97-AF65-F5344CB8AC3E}">
-        <p14:creationId xmlns="" xmlns:p14="http://schemas.microsoft.com/office/powerpoint/2010/main" val="1882660213"/>
+        <p14:creationId xmlns:p14="http://schemas.microsoft.com/office/powerpoint/2010/main" xmlns="" val="1882660213"/>
       </p:ext>
     </p:extLst>
   </p:cSld>
@@ -742,7 +742,7 @@
     </p:spTree>
     <p:extLst>
       <p:ext uri="{BB962C8B-B14F-4D97-AF65-F5344CB8AC3E}">
-        <p14:creationId xmlns="" xmlns:p14="http://schemas.microsoft.com/office/powerpoint/2010/main" val="2781074432"/>
+        <p14:creationId xmlns:p14="http://schemas.microsoft.com/office/powerpoint/2010/main" xmlns="" val="2781074432"/>
       </p:ext>
     </p:extLst>
   </p:cSld>
@@ -4520,37 +4520,7 @@
                 <a:latin typeface="Calibri" pitchFamily="34" charset="0"/>
                 <a:cs typeface="+mn-cs"/>
               </a:rPr>
-              <a:t>Seminar „Einführung </a:t>
-            </a:r>
-            <a:r>
-              <a:rPr lang="de-DE" noProof="0" dirty="0" smtClean="0">
-                <a:solidFill>
-                  <a:schemeClr val="bg1"/>
-                </a:solidFill>
-                <a:latin typeface="Calibri" pitchFamily="34" charset="0"/>
-                <a:cs typeface="+mn-cs"/>
-              </a:rPr>
-              <a:t>in die </a:t>
-            </a:r>
-            <a:r>
-              <a:rPr lang="de-DE" noProof="0" dirty="0" smtClean="0">
-                <a:solidFill>
-                  <a:schemeClr val="bg1"/>
-                </a:solidFill>
-                <a:latin typeface="Calibri" pitchFamily="34" charset="0"/>
-                <a:cs typeface="+mn-cs"/>
-              </a:rPr>
-              <a:t>Modellierung“, </a:t>
-            </a:r>
-            <a:r>
-              <a:rPr lang="de-DE" noProof="0" dirty="0" smtClean="0">
-                <a:solidFill>
-                  <a:schemeClr val="bg1"/>
-                </a:solidFill>
-                <a:latin typeface="Calibri" pitchFamily="34" charset="0"/>
-                <a:cs typeface="+mn-cs"/>
-              </a:rPr>
-              <a:t>Wintersemester 2016/17                 #</a:t>
+              <a:t>Seminar „Einführung in die Modellierung“, Wintersemester 2016/17                 #</a:t>
             </a:r>
             <a:fld id="{19621714-58BB-457A-826B-841F6E217726}" type="slidenum">
               <a:rPr lang="de-DE" noProof="0" smtClean="0">
@@ -5350,17 +5320,8 @@
                 <a:rPr lang="de-DE" sz="2000" i="1" dirty="0" smtClean="0">
                   <a:latin typeface="Calibri" pitchFamily="34" charset="0"/>
                 </a:rPr>
-                <a:t>Versuchsplanung und Geoökologische </a:t>
+                <a:t>Versuchsplanung und Geoökologische Modellierung</a:t>
               </a:r>
-              <a:r>
-                <a:rPr lang="de-DE" sz="2000" i="1" dirty="0" smtClean="0">
-                  <a:latin typeface="Calibri" pitchFamily="34" charset="0"/>
-                </a:rPr>
-                <a:t>Modellierung</a:t>
-              </a:r>
-              <a:endParaRPr lang="de-DE" sz="2000" i="1" dirty="0" smtClean="0">
-                <a:latin typeface="Calibri" pitchFamily="34" charset="0"/>
-              </a:endParaRPr>
             </a:p>
           </p:txBody>
         </p:sp>
@@ -18583,7 +18544,7 @@
         <p:spPr>
           <a:xfrm>
             <a:off x="395536" y="2348880"/>
-            <a:ext cx="8569325" cy="1800493"/>
+            <a:ext cx="8569325" cy="1354217"/>
           </a:xfrm>
           <a:prstGeom prst="rect">
             <a:avLst/>
@@ -18637,23 +18598,17 @@
               <a:rPr lang="de-DE" sz="2400" dirty="0" smtClean="0">
                 <a:latin typeface="Calibri" pitchFamily="34" charset="0"/>
               </a:rPr>
-              <a:t>Abbildung physikalischer Prozesse (Verdunstung, Schnee)</a:t>
-            </a:r>
-          </a:p>
-          <a:p>
-            <a:pPr marL="355600" indent="-355600">
-              <a:spcAft>
-                <a:spcPts val="600"/>
-              </a:spcAft>
-              <a:buFont typeface="Wingdings" pitchFamily="2" charset="2"/>
-              <a:buChar char=""/>
-            </a:pPr>
+              <a:t>Abbildung physikalischer Prozesse (Verdunstung, Schnee</a:t>
+            </a:r>
             <a:r>
               <a:rPr lang="de-DE" sz="2400" dirty="0" smtClean="0">
                 <a:latin typeface="Calibri" pitchFamily="34" charset="0"/>
               </a:rPr>
-              <a:t>Dynamik für schnelle und langsame Abflusskomponenten</a:t>
-            </a:r>
+              <a:t>)</a:t>
+            </a:r>
+            <a:endParaRPr lang="de-DE" sz="2400" dirty="0" smtClean="0">
+              <a:latin typeface="Calibri" pitchFamily="34" charset="0"/>
+            </a:endParaRPr>
           </a:p>
         </p:txBody>
       </p:sp>
@@ -18666,7 +18621,7 @@
         <p:spPr>
           <a:xfrm>
             <a:off x="474140" y="2348880"/>
-            <a:ext cx="288000" cy="1800493"/>
+            <a:ext cx="288000" cy="1354217"/>
           </a:xfrm>
           <a:prstGeom prst="rect">
             <a:avLst/>
@@ -18698,7 +18653,7 @@
             </a:r>
           </a:p>
           <a:p>
-            <a:pPr marL="355600" indent="-355600" algn="ctr">
+            <a:pPr marL="355600" indent="-355600">
               <a:spcAft>
                 <a:spcPts val="600"/>
               </a:spcAft>
@@ -18741,24 +18696,6 @@
               </a:rPr>
               <a:t> </a:t>
             </a:r>
-          </a:p>
-          <a:p>
-            <a:pPr marL="355600" indent="-355600" algn="ctr">
-              <a:spcAft>
-                <a:spcPts val="600"/>
-              </a:spcAft>
-            </a:pPr>
-            <a:r>
-              <a:rPr lang="de-DE" sz="2400" b="1" dirty="0" smtClean="0">
-                <a:latin typeface="Calibri" pitchFamily="34" charset="0"/>
-                <a:sym typeface="Wingdings"/>
-              </a:rPr>
-              <a:t>?</a:t>
-            </a:r>
-            <a:endParaRPr lang="de-DE" sz="2400" dirty="0" smtClean="0">
-              <a:latin typeface="Calibri" pitchFamily="34" charset="0"/>
-              <a:sym typeface="Wingdings"/>
-            </a:endParaRPr>
           </a:p>
         </p:txBody>
       </p:sp>
@@ -23981,8 +23918,8 @@
         </p:nvGrpSpPr>
         <p:grpSpPr>
           <a:xfrm>
-            <a:off x="0" y="3140968"/>
-            <a:ext cx="10044608" cy="3096344"/>
+            <a:off x="0" y="3212976"/>
+            <a:ext cx="10044608" cy="3024336"/>
             <a:chOff x="0" y="3140968"/>
             <a:chExt cx="10044608" cy="3096344"/>
           </a:xfrm>
@@ -24102,7 +24039,7 @@
           <p:nvPr/>
         </p:nvGraphicFramePr>
         <p:xfrm>
-          <a:off x="3380116" y="3706671"/>
+          <a:off x="3380116" y="3933056"/>
           <a:ext cx="2088232" cy="753108"/>
         </p:xfrm>
         <a:graphic>
@@ -24121,8 +24058,8 @@
         </p:nvSpPr>
         <p:spPr>
           <a:xfrm>
-            <a:off x="395536" y="4439547"/>
-            <a:ext cx="8569325" cy="1800493"/>
+            <a:off x="395536" y="4739079"/>
+            <a:ext cx="8569325" cy="1354217"/>
           </a:xfrm>
           <a:prstGeom prst="rect">
             <a:avLst/>
@@ -24176,23 +24113,29 @@
               <a:rPr lang="de-DE" sz="2400" dirty="0" smtClean="0">
                 <a:latin typeface="Calibri" pitchFamily="34" charset="0"/>
               </a:rPr>
-              <a:t>Abbildung physikalischer Prozesse (Verdunstung, Schnee)</a:t>
-            </a:r>
-          </a:p>
-          <a:p>
-            <a:pPr marL="355600" indent="-355600">
-              <a:spcAft>
-                <a:spcPts val="600"/>
-              </a:spcAft>
-              <a:buFont typeface="Wingdings" pitchFamily="2" charset="2"/>
-              <a:buChar char="ð"/>
-            </a:pPr>
+              <a:t>Abbildung physikalischer Prozesse </a:t>
+            </a:r>
             <a:r>
               <a:rPr lang="de-DE" sz="2400" dirty="0" smtClean="0">
                 <a:latin typeface="Calibri" pitchFamily="34" charset="0"/>
               </a:rPr>
-              <a:t>Dynamik für schnelle und langsame Abflusskomponenten</a:t>
-            </a:r>
+              <a:t>(z.B. Verdunstung</a:t>
+            </a:r>
+            <a:r>
+              <a:rPr lang="de-DE" sz="2400" dirty="0" smtClean="0">
+                <a:latin typeface="Calibri" pitchFamily="34" charset="0"/>
+              </a:rPr>
+              <a:t>, Schnee</a:t>
+            </a:r>
+            <a:r>
+              <a:rPr lang="de-DE" sz="2400" dirty="0" smtClean="0">
+                <a:latin typeface="Calibri" pitchFamily="34" charset="0"/>
+              </a:rPr>
+              <a:t>)</a:t>
+            </a:r>
+            <a:endParaRPr lang="de-DE" sz="2400" dirty="0" smtClean="0">
+              <a:latin typeface="Calibri" pitchFamily="34" charset="0"/>
+            </a:endParaRPr>
           </a:p>
         </p:txBody>
       </p:sp>
@@ -24679,55 +24622,6 @@
                                           <p:spTgt spid="8">
                                             <p:txEl>
                                               <p:pRg st="2" end="2"/>
-                                            </p:txEl>
-                                          </p:spTgt>
-                                        </p:tgtEl>
-                                        <p:attrNameLst>
-                                          <p:attrName>style.visibility</p:attrName>
-                                        </p:attrNameLst>
-                                      </p:cBhvr>
-                                      <p:to>
-                                        <p:strVal val="visible"/>
-                                      </p:to>
-                                    </p:set>
-                                  </p:childTnLst>
-                                </p:cTn>
-                              </p:par>
-                            </p:childTnLst>
-                          </p:cTn>
-                        </p:par>
-                      </p:childTnLst>
-                    </p:cTn>
-                  </p:par>
-                  <p:par>
-                    <p:cTn id="42" fill="hold">
-                      <p:stCondLst>
-                        <p:cond delay="indefinite"/>
-                      </p:stCondLst>
-                      <p:childTnLst>
-                        <p:par>
-                          <p:cTn id="43" fill="hold">
-                            <p:stCondLst>
-                              <p:cond delay="0"/>
-                            </p:stCondLst>
-                            <p:childTnLst>
-                              <p:par>
-                                <p:cTn id="44" presetID="1" presetClass="entr" presetSubtype="0" fill="hold" grpId="0" nodeType="clickEffect">
-                                  <p:stCondLst>
-                                    <p:cond delay="0"/>
-                                  </p:stCondLst>
-                                  <p:childTnLst>
-                                    <p:set>
-                                      <p:cBhvr>
-                                        <p:cTn id="45" dur="1" fill="hold">
-                                          <p:stCondLst>
-                                            <p:cond delay="0"/>
-                                          </p:stCondLst>
-                                        </p:cTn>
-                                        <p:tgtEl>
-                                          <p:spTgt spid="8">
-                                            <p:txEl>
-                                              <p:pRg st="3" end="3"/>
                                             </p:txEl>
                                           </p:spTgt>
                                         </p:tgtEl>

</xml_diff>

<commit_message>
Kosmetische Änderungen Termin 2
</commit_message>
<xml_diff>
--- a/Termin_2/folien/UebungModellierung#2.pptx
+++ b/Termin_2/folien/UebungModellierung#2.pptx
@@ -403,7 +403,7 @@
     </p:spTree>
     <p:extLst>
       <p:ext uri="{BB962C8B-B14F-4D97-AF65-F5344CB8AC3E}">
-        <p14:creationId xmlns:p14="http://schemas.microsoft.com/office/powerpoint/2010/main" xmlns="" val="1882660213"/>
+        <p14:creationId xmlns="" xmlns:p14="http://schemas.microsoft.com/office/powerpoint/2010/main" val="1882660213"/>
       </p:ext>
     </p:extLst>
   </p:cSld>
@@ -742,7 +742,7 @@
     </p:spTree>
     <p:extLst>
       <p:ext uri="{BB962C8B-B14F-4D97-AF65-F5344CB8AC3E}">
-        <p14:creationId xmlns:p14="http://schemas.microsoft.com/office/powerpoint/2010/main" xmlns="" val="2781074432"/>
+        <p14:creationId xmlns="" xmlns:p14="http://schemas.microsoft.com/office/powerpoint/2010/main" val="2781074432"/>
       </p:ext>
     </p:extLst>
   </p:cSld>
@@ -1788,10 +1788,7 @@
           <a:lstStyle/>
           <a:p>
             <a:pPr eaLnBrk="1" hangingPunct="1"/>
-            <a:r>
-              <a:rPr lang="en-US" dirty="0" smtClean="0"/>
-              <a:t>This is the main motivation…</a:t>
-            </a:r>
+            <a:endParaRPr lang="en-US" dirty="0" smtClean="0"/>
           </a:p>
         </p:txBody>
       </p:sp>
@@ -10225,10 +10222,16 @@
               <a:t>abc</a:t>
             </a:r>
             <a:r>
+              <a:rPr lang="de-DE" sz="2800" i="1" dirty="0" smtClean="0">
+                <a:latin typeface="Calibri" pitchFamily="34" charset="0"/>
+              </a:rPr>
+              <a:t>-</a:t>
+            </a:r>
+            <a:r>
               <a:rPr lang="de-DE" sz="2800" dirty="0" smtClean="0">
                 <a:latin typeface="Calibri" pitchFamily="34" charset="0"/>
               </a:rPr>
-              <a:t> Modell</a:t>
+              <a:t>Modell</a:t>
             </a:r>
             <a:endParaRPr lang="de-DE" sz="2800" dirty="0">
               <a:latin typeface="Calibri" pitchFamily="34" charset="0"/>
@@ -11901,10 +11904,16 @@
               <a:t>abc</a:t>
             </a:r>
             <a:r>
+              <a:rPr lang="de-DE" sz="2800" i="1" dirty="0" smtClean="0">
+                <a:latin typeface="Calibri" pitchFamily="34" charset="0"/>
+              </a:rPr>
+              <a:t>-</a:t>
+            </a:r>
+            <a:r>
               <a:rPr lang="de-DE" sz="2800" dirty="0" smtClean="0">
                 <a:latin typeface="Calibri" pitchFamily="34" charset="0"/>
               </a:rPr>
-              <a:t> Modell</a:t>
+              <a:t>Modell</a:t>
             </a:r>
             <a:endParaRPr lang="de-DE" sz="2800" dirty="0">
               <a:latin typeface="Calibri" pitchFamily="34" charset="0"/>
@@ -14262,10 +14271,16 @@
               <a:t>abc</a:t>
             </a:r>
             <a:r>
+              <a:rPr lang="de-DE" sz="2800" i="1" dirty="0" smtClean="0">
+                <a:latin typeface="Calibri" pitchFamily="34" charset="0"/>
+              </a:rPr>
+              <a:t>-</a:t>
+            </a:r>
+            <a:r>
               <a:rPr lang="de-DE" sz="2800" dirty="0" smtClean="0">
                 <a:latin typeface="Calibri" pitchFamily="34" charset="0"/>
               </a:rPr>
-              <a:t> Modell</a:t>
+              <a:t>Modell</a:t>
             </a:r>
             <a:endParaRPr lang="de-DE" sz="2800" dirty="0">
               <a:latin typeface="Calibri" pitchFamily="34" charset="0"/>
@@ -16522,10 +16537,16 @@
               <a:t>abc</a:t>
             </a:r>
             <a:r>
+              <a:rPr lang="de-DE" sz="2800" i="1" dirty="0" smtClean="0">
+                <a:latin typeface="Calibri" pitchFamily="34" charset="0"/>
+              </a:rPr>
+              <a:t>-</a:t>
+            </a:r>
+            <a:r>
               <a:rPr lang="de-DE" sz="2800" dirty="0" smtClean="0">
                 <a:latin typeface="Calibri" pitchFamily="34" charset="0"/>
               </a:rPr>
-              <a:t> Modell</a:t>
+              <a:t>Modell</a:t>
             </a:r>
             <a:endParaRPr lang="de-DE" sz="2800" dirty="0">
               <a:latin typeface="Calibri" pitchFamily="34" charset="0"/>
@@ -18095,6 +18116,9 @@
           <a:prstGeom prst="rect">
             <a:avLst/>
           </a:prstGeom>
+          <a:solidFill>
+            <a:schemeClr val="bg1"/>
+          </a:solidFill>
         </p:spPr>
         <p:txBody>
           <a:bodyPr wrap="none">
@@ -18171,6 +18195,9 @@
           <a:prstGeom prst="rect">
             <a:avLst/>
           </a:prstGeom>
+          <a:solidFill>
+            <a:schemeClr val="bg1"/>
+          </a:solidFill>
         </p:spPr>
         <p:txBody>
           <a:bodyPr wrap="none">
@@ -18247,6 +18274,9 @@
           <a:prstGeom prst="rect">
             <a:avLst/>
           </a:prstGeom>
+          <a:solidFill>
+            <a:schemeClr val="bg1"/>
+          </a:solidFill>
         </p:spPr>
         <p:txBody>
           <a:bodyPr wrap="none">
@@ -18323,6 +18353,9 @@
           <a:prstGeom prst="rect">
             <a:avLst/>
           </a:prstGeom>
+          <a:solidFill>
+            <a:schemeClr val="bg1"/>
+          </a:solidFill>
         </p:spPr>
         <p:txBody>
           <a:bodyPr wrap="none">
@@ -18387,10 +18420,16 @@
               <a:t>abc</a:t>
             </a:r>
             <a:r>
+              <a:rPr lang="de-DE" sz="2800" i="1" dirty="0" smtClean="0">
+                <a:latin typeface="Calibri" pitchFamily="34" charset="0"/>
+              </a:rPr>
+              <a:t>-</a:t>
+            </a:r>
+            <a:r>
               <a:rPr lang="de-DE" sz="2800" dirty="0" smtClean="0">
                 <a:latin typeface="Calibri" pitchFamily="34" charset="0"/>
               </a:rPr>
-              <a:t> Modell</a:t>
+              <a:t>Modell</a:t>
             </a:r>
             <a:endParaRPr lang="de-DE" sz="2800" dirty="0">
               <a:latin typeface="Calibri" pitchFamily="34" charset="0"/>
@@ -18598,17 +18637,8 @@
               <a:rPr lang="de-DE" sz="2400" dirty="0" smtClean="0">
                 <a:latin typeface="Calibri" pitchFamily="34" charset="0"/>
               </a:rPr>
-              <a:t>Abbildung physikalischer Prozesse (Verdunstung, Schnee</a:t>
-            </a:r>
-            <a:r>
-              <a:rPr lang="de-DE" sz="2400" dirty="0" smtClean="0">
-                <a:latin typeface="Calibri" pitchFamily="34" charset="0"/>
-              </a:rPr>
-              <a:t>)</a:t>
-            </a:r>
-            <a:endParaRPr lang="de-DE" sz="2400" dirty="0" smtClean="0">
-              <a:latin typeface="Calibri" pitchFamily="34" charset="0"/>
-            </a:endParaRPr>
+              <a:t>Abbildung physikalischer Prozesse (Verdunstung, Schnee)</a:t>
+            </a:r>
           </a:p>
         </p:txBody>
       </p:sp>
@@ -18733,16 +18763,28 @@
               <a:t>Welche dieser Kriterien erfüllt das </a:t>
             </a:r>
             <a:r>
+              <a:rPr lang="de-DE" sz="2400" i="1" dirty="0" err="1" smtClean="0">
+                <a:latin typeface="Calibri" pitchFamily="34" charset="0"/>
+              </a:rPr>
+              <a:t>abc</a:t>
+            </a:r>
+            <a:r>
               <a:rPr lang="de-DE" sz="2400" i="1" dirty="0" smtClean="0">
                 <a:latin typeface="Calibri" pitchFamily="34" charset="0"/>
               </a:rPr>
-              <a:t>abc</a:t>
+              <a:t>-</a:t>
             </a:r>
             <a:r>
               <a:rPr lang="de-DE" sz="2400" dirty="0" smtClean="0">
                 <a:latin typeface="Calibri" pitchFamily="34" charset="0"/>
               </a:rPr>
-              <a:t> Modell?</a:t>
+              <a:t>Modell</a:t>
+            </a:r>
+            <a:r>
+              <a:rPr lang="de-DE" sz="2400" dirty="0" smtClean="0">
+                <a:latin typeface="Calibri" pitchFamily="34" charset="0"/>
+              </a:rPr>
+              <a:t>?</a:t>
             </a:r>
           </a:p>
         </p:txBody>
@@ -18781,16 +18823,28 @@
               <a:t>Weitere Schwächen des </a:t>
             </a:r>
             <a:r>
+              <a:rPr lang="de-DE" sz="2400" i="1" dirty="0" err="1" smtClean="0">
+                <a:latin typeface="Calibri" pitchFamily="34" charset="0"/>
+              </a:rPr>
+              <a:t>abc</a:t>
+            </a:r>
+            <a:r>
               <a:rPr lang="de-DE" sz="2400" i="1" dirty="0" smtClean="0">
                 <a:latin typeface="Calibri" pitchFamily="34" charset="0"/>
               </a:rPr>
-              <a:t>abc </a:t>
+              <a:t>-</a:t>
             </a:r>
             <a:r>
               <a:rPr lang="de-DE" sz="2400" dirty="0" smtClean="0">
                 <a:latin typeface="Calibri" pitchFamily="34" charset="0"/>
               </a:rPr>
-              <a:t>Modells?</a:t>
+              <a:t>Modells</a:t>
+            </a:r>
+            <a:r>
+              <a:rPr lang="de-DE" sz="2400" dirty="0" smtClean="0">
+                <a:latin typeface="Calibri" pitchFamily="34" charset="0"/>
+              </a:rPr>
+              <a:t>?</a:t>
             </a:r>
           </a:p>
         </p:txBody>
@@ -24113,29 +24167,8 @@
               <a:rPr lang="de-DE" sz="2400" dirty="0" smtClean="0">
                 <a:latin typeface="Calibri" pitchFamily="34" charset="0"/>
               </a:rPr>
-              <a:t>Abbildung physikalischer Prozesse </a:t>
-            </a:r>
-            <a:r>
-              <a:rPr lang="de-DE" sz="2400" dirty="0" smtClean="0">
-                <a:latin typeface="Calibri" pitchFamily="34" charset="0"/>
-              </a:rPr>
-              <a:t>(z.B. Verdunstung</a:t>
-            </a:r>
-            <a:r>
-              <a:rPr lang="de-DE" sz="2400" dirty="0" smtClean="0">
-                <a:latin typeface="Calibri" pitchFamily="34" charset="0"/>
-              </a:rPr>
-              <a:t>, Schnee</a:t>
-            </a:r>
-            <a:r>
-              <a:rPr lang="de-DE" sz="2400" dirty="0" smtClean="0">
-                <a:latin typeface="Calibri" pitchFamily="34" charset="0"/>
-              </a:rPr>
-              <a:t>)</a:t>
-            </a:r>
-            <a:endParaRPr lang="de-DE" sz="2400" dirty="0" smtClean="0">
-              <a:latin typeface="Calibri" pitchFamily="34" charset="0"/>
-            </a:endParaRPr>
+              <a:t>Abbildung physikalischer Prozesse (z.B. Verdunstung, Schnee)</a:t>
+            </a:r>
           </a:p>
         </p:txBody>
       </p:sp>

</xml_diff>